<commit_message>
Added new powerpoint with updated figures
</commit_message>
<xml_diff>
--- a/Health Informatics Beyond Wishes Specification.pptx
+++ b/Health Informatics Beyond Wishes Specification.pptx
@@ -12,6 +12,7 @@
     <p:sldId id="258" r:id="rId6"/>
     <p:sldId id="261" r:id="rId7"/>
     <p:sldId id="260" r:id="rId8"/>
+    <p:sldId id="263" r:id="rId9"/>
   </p:sldIdLst>
   <p:sldSz cx="12192000" cy="6858000"/>
   <p:notesSz cx="6858000" cy="9144000"/>
@@ -265,7 +266,7 @@
           <a:p>
             <a:fld id="{18988D34-52C3-4F9D-9214-9FF30450B2B7}" type="datetimeFigureOut">
               <a:rPr lang="da-DK" smtClean="0"/>
-              <a:t>18-04-2024</a:t>
+              <a:t>12-05-2024</a:t>
             </a:fld>
             <a:endParaRPr lang="da-DK"/>
           </a:p>
@@ -463,7 +464,7 @@
           <a:p>
             <a:fld id="{18988D34-52C3-4F9D-9214-9FF30450B2B7}" type="datetimeFigureOut">
               <a:rPr lang="da-DK" smtClean="0"/>
-              <a:t>18-04-2024</a:t>
+              <a:t>12-05-2024</a:t>
             </a:fld>
             <a:endParaRPr lang="da-DK"/>
           </a:p>
@@ -671,7 +672,7 @@
           <a:p>
             <a:fld id="{18988D34-52C3-4F9D-9214-9FF30450B2B7}" type="datetimeFigureOut">
               <a:rPr lang="da-DK" smtClean="0"/>
-              <a:t>18-04-2024</a:t>
+              <a:t>12-05-2024</a:t>
             </a:fld>
             <a:endParaRPr lang="da-DK"/>
           </a:p>
@@ -869,7 +870,7 @@
           <a:p>
             <a:fld id="{18988D34-52C3-4F9D-9214-9FF30450B2B7}" type="datetimeFigureOut">
               <a:rPr lang="da-DK" smtClean="0"/>
-              <a:t>18-04-2024</a:t>
+              <a:t>12-05-2024</a:t>
             </a:fld>
             <a:endParaRPr lang="da-DK"/>
           </a:p>
@@ -1144,7 +1145,7 @@
           <a:p>
             <a:fld id="{18988D34-52C3-4F9D-9214-9FF30450B2B7}" type="datetimeFigureOut">
               <a:rPr lang="da-DK" smtClean="0"/>
-              <a:t>18-04-2024</a:t>
+              <a:t>12-05-2024</a:t>
             </a:fld>
             <a:endParaRPr lang="da-DK"/>
           </a:p>
@@ -1409,7 +1410,7 @@
           <a:p>
             <a:fld id="{18988D34-52C3-4F9D-9214-9FF30450B2B7}" type="datetimeFigureOut">
               <a:rPr lang="da-DK" smtClean="0"/>
-              <a:t>18-04-2024</a:t>
+              <a:t>12-05-2024</a:t>
             </a:fld>
             <a:endParaRPr lang="da-DK"/>
           </a:p>
@@ -1821,7 +1822,7 @@
           <a:p>
             <a:fld id="{18988D34-52C3-4F9D-9214-9FF30450B2B7}" type="datetimeFigureOut">
               <a:rPr lang="da-DK" smtClean="0"/>
-              <a:t>18-04-2024</a:t>
+              <a:t>12-05-2024</a:t>
             </a:fld>
             <a:endParaRPr lang="da-DK"/>
           </a:p>
@@ -1962,7 +1963,7 @@
           <a:p>
             <a:fld id="{18988D34-52C3-4F9D-9214-9FF30450B2B7}" type="datetimeFigureOut">
               <a:rPr lang="da-DK" smtClean="0"/>
-              <a:t>18-04-2024</a:t>
+              <a:t>12-05-2024</a:t>
             </a:fld>
             <a:endParaRPr lang="da-DK"/>
           </a:p>
@@ -2075,7 +2076,7 @@
           <a:p>
             <a:fld id="{18988D34-52C3-4F9D-9214-9FF30450B2B7}" type="datetimeFigureOut">
               <a:rPr lang="da-DK" smtClean="0"/>
-              <a:t>18-04-2024</a:t>
+              <a:t>12-05-2024</a:t>
             </a:fld>
             <a:endParaRPr lang="da-DK"/>
           </a:p>
@@ -2386,7 +2387,7 @@
           <a:p>
             <a:fld id="{18988D34-52C3-4F9D-9214-9FF30450B2B7}" type="datetimeFigureOut">
               <a:rPr lang="da-DK" smtClean="0"/>
-              <a:t>18-04-2024</a:t>
+              <a:t>12-05-2024</a:t>
             </a:fld>
             <a:endParaRPr lang="da-DK"/>
           </a:p>
@@ -2674,7 +2675,7 @@
           <a:p>
             <a:fld id="{18988D34-52C3-4F9D-9214-9FF30450B2B7}" type="datetimeFigureOut">
               <a:rPr lang="da-DK" smtClean="0"/>
-              <a:t>18-04-2024</a:t>
+              <a:t>12-05-2024</a:t>
             </a:fld>
             <a:endParaRPr lang="da-DK"/>
           </a:p>
@@ -2915,7 +2916,7 @@
           <a:p>
             <a:fld id="{18988D34-52C3-4F9D-9214-9FF30450B2B7}" type="datetimeFigureOut">
               <a:rPr lang="da-DK" smtClean="0"/>
-              <a:t>18-04-2024</a:t>
+              <a:t>12-05-2024</a:t>
             </a:fld>
             <a:endParaRPr lang="da-DK"/>
           </a:p>
@@ -4149,7 +4150,7 @@
         </p:nvSpPr>
         <p:spPr>
           <a:xfrm rot="2578978">
-            <a:off x="4361205" y="5097857"/>
+            <a:off x="4361205" y="4779205"/>
             <a:ext cx="1412189" cy="461665"/>
           </a:xfrm>
           <a:prstGeom prst="rect">
@@ -4188,35 +4189,6 @@
       </p:sp>
       <p:sp>
         <p:nvSpPr>
-          <p:cNvPr id="2" name="Titel 1">
-            <a:extLst>
-              <a:ext uri="{FF2B5EF4-FFF2-40B4-BE49-F238E27FC236}">
-                <a16:creationId xmlns:a16="http://schemas.microsoft.com/office/drawing/2014/main" id="{CC447909-F72D-9B1E-D814-2261A691A02A}"/>
-              </a:ext>
-            </a:extLst>
-          </p:cNvPr>
-          <p:cNvSpPr>
-            <a:spLocks noGrp="1"/>
-          </p:cNvSpPr>
-          <p:nvPr>
-            <p:ph type="title"/>
-          </p:nvPr>
-        </p:nvSpPr>
-        <p:spPr/>
-        <p:txBody>
-          <a:bodyPr/>
-          <a:lstStyle/>
-          <a:p>
-            <a:r>
-              <a:rPr lang="en-GB" dirty="0"/>
-              <a:t>Rich picture diagram</a:t>
-            </a:r>
-            <a:endParaRPr lang="da-DK" dirty="0"/>
-          </a:p>
-        </p:txBody>
-      </p:sp>
-      <p:sp>
-        <p:nvSpPr>
           <p:cNvPr id="4" name="Rutediagram: Magnetpladelager 3">
             <a:extLst>
               <a:ext uri="{FF2B5EF4-FFF2-40B4-BE49-F238E27FC236}">
@@ -4229,7 +4201,7 @@
         </p:nvSpPr>
         <p:spPr>
           <a:xfrm>
-            <a:off x="1008706" y="2867360"/>
+            <a:off x="1008706" y="2548708"/>
             <a:ext cx="841248" cy="1325563"/>
           </a:xfrm>
           <a:prstGeom prst="flowChartMagneticDisk">
@@ -4296,7 +4268,7 @@
         </p:blipFill>
         <p:spPr>
           <a:xfrm>
-            <a:off x="5942245" y="944717"/>
+            <a:off x="5942245" y="626065"/>
             <a:ext cx="914400" cy="914400"/>
           </a:xfrm>
           <a:prstGeom prst="rect">
@@ -4335,7 +4307,7 @@
         </p:blipFill>
         <p:spPr>
           <a:xfrm>
-            <a:off x="8279664" y="3189090"/>
+            <a:off x="8279664" y="2870438"/>
             <a:ext cx="914400" cy="914400"/>
           </a:xfrm>
           <a:prstGeom prst="rect">
@@ -4374,7 +4346,7 @@
         </p:blipFill>
         <p:spPr>
           <a:xfrm>
-            <a:off x="5879927" y="5512841"/>
+            <a:off x="5879927" y="5194189"/>
             <a:ext cx="980029" cy="980029"/>
           </a:xfrm>
           <a:prstGeom prst="rect">
@@ -4413,7 +4385,7 @@
         </p:blipFill>
         <p:spPr>
           <a:xfrm>
-            <a:off x="10484660" y="5228999"/>
+            <a:off x="10484660" y="4910347"/>
             <a:ext cx="914400" cy="914400"/>
           </a:xfrm>
           <a:prstGeom prst="rect">
@@ -4452,7 +4424,7 @@
         </p:blipFill>
         <p:spPr>
           <a:xfrm>
-            <a:off x="10408460" y="3145521"/>
+            <a:off x="10408460" y="2826869"/>
             <a:ext cx="914400" cy="914400"/>
           </a:xfrm>
           <a:prstGeom prst="rect">
@@ -4474,7 +4446,7 @@
         </p:nvGrpSpPr>
         <p:grpSpPr>
           <a:xfrm>
-            <a:off x="3086520" y="2804021"/>
+            <a:off x="3086520" y="2485369"/>
             <a:ext cx="1655151" cy="1655151"/>
             <a:chOff x="2391576" y="2804021"/>
             <a:chExt cx="1655151" cy="1655151"/>
@@ -4574,7 +4546,7 @@
         </p:nvGrpSpPr>
         <p:grpSpPr>
           <a:xfrm>
-            <a:off x="3691591" y="4246965"/>
+            <a:off x="3691591" y="3928313"/>
             <a:ext cx="445008" cy="938328"/>
             <a:chOff x="4955538" y="4800600"/>
             <a:chExt cx="445008" cy="938328"/>
@@ -4675,7 +4647,7 @@
         </p:nvGrpSpPr>
         <p:grpSpPr>
           <a:xfrm rot="16200000">
-            <a:off x="2261069" y="3162432"/>
+            <a:off x="2261069" y="2843780"/>
             <a:ext cx="445008" cy="938328"/>
             <a:chOff x="4955538" y="4800600"/>
             <a:chExt cx="445008" cy="938328"/>
@@ -4793,7 +4765,7 @@
         </p:blipFill>
         <p:spPr>
           <a:xfrm>
-            <a:off x="3330816" y="5228999"/>
+            <a:off x="3330816" y="4910347"/>
             <a:ext cx="1211147" cy="1211147"/>
           </a:xfrm>
           <a:prstGeom prst="rect">
@@ -4815,7 +4787,7 @@
         </p:nvSpPr>
         <p:spPr>
           <a:xfrm>
-            <a:off x="3217144" y="6257389"/>
+            <a:off x="3217144" y="5938737"/>
             <a:ext cx="1412189" cy="646331"/>
           </a:xfrm>
           <a:prstGeom prst="rect">
@@ -4866,7 +4838,7 @@
         </p:nvGrpSpPr>
         <p:grpSpPr>
           <a:xfrm rot="5400000">
-            <a:off x="5017758" y="3162432"/>
+            <a:off x="5017758" y="2843780"/>
             <a:ext cx="445008" cy="938328"/>
             <a:chOff x="4955538" y="4800600"/>
             <a:chExt cx="445008" cy="938328"/>
@@ -4967,7 +4939,7 @@
         </p:nvGrpSpPr>
         <p:grpSpPr>
           <a:xfrm rot="5400000">
-            <a:off x="7448293" y="3162432"/>
+            <a:off x="7448293" y="2843780"/>
             <a:ext cx="445008" cy="938328"/>
             <a:chOff x="4955538" y="4800600"/>
             <a:chExt cx="445008" cy="938328"/>
@@ -5068,7 +5040,7 @@
         </p:nvSpPr>
         <p:spPr>
           <a:xfrm>
-            <a:off x="5359134" y="6409594"/>
+            <a:off x="5359134" y="6090942"/>
             <a:ext cx="2113876" cy="369332"/>
           </a:xfrm>
           <a:prstGeom prst="rect">
@@ -5110,7 +5082,7 @@
         </p:nvCxnSpPr>
         <p:spPr>
           <a:xfrm flipV="1">
-            <a:off x="6369998" y="2334857"/>
+            <a:off x="6369998" y="2016205"/>
             <a:ext cx="0" cy="938328"/>
           </a:xfrm>
           <a:prstGeom prst="straightConnector1">
@@ -5149,7 +5121,7 @@
         </p:nvGrpSpPr>
         <p:grpSpPr>
           <a:xfrm rot="5400000">
-            <a:off x="9461156" y="3190879"/>
+            <a:off x="9461156" y="2872227"/>
             <a:ext cx="445008" cy="938328"/>
             <a:chOff x="4955538" y="4800600"/>
             <a:chExt cx="445008" cy="938328"/>
@@ -5250,7 +5222,7 @@
         </p:nvCxnSpPr>
         <p:spPr>
           <a:xfrm>
-            <a:off x="10941860" y="4246965"/>
+            <a:off x="10941860" y="3928313"/>
             <a:ext cx="0" cy="938328"/>
           </a:xfrm>
           <a:prstGeom prst="straightConnector1">
@@ -5289,7 +5261,7 @@
         </p:nvSpPr>
         <p:spPr>
           <a:xfrm>
-            <a:off x="7796814" y="4045816"/>
+            <a:off x="7796814" y="3727164"/>
             <a:ext cx="1901304" cy="646331"/>
           </a:xfrm>
           <a:prstGeom prst="rect">
@@ -5329,7 +5301,7 @@
         </p:nvSpPr>
         <p:spPr>
           <a:xfrm>
-            <a:off x="9980150" y="3899474"/>
+            <a:off x="9980150" y="3580822"/>
             <a:ext cx="1901304" cy="369332"/>
           </a:xfrm>
           <a:prstGeom prst="rect">
@@ -5369,7 +5341,7 @@
         </p:nvSpPr>
         <p:spPr>
           <a:xfrm>
-            <a:off x="9991208" y="6123543"/>
+            <a:off x="9991208" y="5804891"/>
             <a:ext cx="1901304" cy="369332"/>
           </a:xfrm>
           <a:prstGeom prst="rect">
@@ -5409,7 +5381,7 @@
         </p:nvSpPr>
         <p:spPr>
           <a:xfrm>
-            <a:off x="5448793" y="1736731"/>
+            <a:off x="5448793" y="1418079"/>
             <a:ext cx="1901304" cy="646331"/>
           </a:xfrm>
           <a:prstGeom prst="rect">
@@ -5449,7 +5421,7 @@
         </p:nvSpPr>
         <p:spPr>
           <a:xfrm>
-            <a:off x="5410878" y="4007708"/>
+            <a:off x="5410878" y="3689056"/>
             <a:ext cx="1901304" cy="646331"/>
           </a:xfrm>
           <a:prstGeom prst="rect">
@@ -5491,7 +5463,7 @@
         </p:nvCxnSpPr>
         <p:spPr>
           <a:xfrm>
-            <a:off x="6369998" y="4627510"/>
+            <a:off x="6369998" y="4308858"/>
             <a:ext cx="0" cy="938328"/>
           </a:xfrm>
           <a:prstGeom prst="straightConnector1">
@@ -5530,7 +5502,7 @@
         </p:nvSpPr>
         <p:spPr>
           <a:xfrm>
-            <a:off x="4561008" y="3631596"/>
+            <a:off x="4561008" y="3312944"/>
             <a:ext cx="1412189" cy="276999"/>
           </a:xfrm>
           <a:prstGeom prst="rect">
@@ -5570,7 +5542,7 @@
         </p:nvSpPr>
         <p:spPr>
           <a:xfrm>
-            <a:off x="4509680" y="3168642"/>
+            <a:off x="4509680" y="2849990"/>
             <a:ext cx="1412189" cy="276999"/>
           </a:xfrm>
           <a:prstGeom prst="rect">
@@ -5610,7 +5582,7 @@
         </p:nvSpPr>
         <p:spPr>
           <a:xfrm>
-            <a:off x="8964591" y="3180160"/>
+            <a:off x="8964591" y="2861508"/>
             <a:ext cx="1412189" cy="276999"/>
           </a:xfrm>
           <a:prstGeom prst="rect">
@@ -5650,7 +5622,7 @@
         </p:nvSpPr>
         <p:spPr>
           <a:xfrm>
-            <a:off x="8996271" y="3616816"/>
+            <a:off x="8996271" y="3298164"/>
             <a:ext cx="1412189" cy="276999"/>
           </a:xfrm>
           <a:prstGeom prst="rect">
@@ -5690,7 +5662,7 @@
         </p:nvSpPr>
         <p:spPr>
           <a:xfrm>
-            <a:off x="10469265" y="4504728"/>
+            <a:off x="10469265" y="4186076"/>
             <a:ext cx="1412189" cy="276999"/>
           </a:xfrm>
           <a:prstGeom prst="rect">
@@ -5730,7 +5702,7 @@
         </p:nvSpPr>
         <p:spPr>
           <a:xfrm>
-            <a:off x="6780159" y="3572305"/>
+            <a:off x="6780159" y="3253653"/>
             <a:ext cx="1798796" cy="276999"/>
           </a:xfrm>
           <a:prstGeom prst="rect">
@@ -5802,7 +5774,7 @@
         </p:nvSpPr>
         <p:spPr>
           <a:xfrm>
-            <a:off x="6747912" y="3166982"/>
+            <a:off x="6747912" y="2848330"/>
             <a:ext cx="1798796" cy="276999"/>
           </a:xfrm>
           <a:prstGeom prst="rect">
@@ -5842,7 +5814,7 @@
         </p:nvSpPr>
         <p:spPr>
           <a:xfrm>
-            <a:off x="6272414" y="4906245"/>
+            <a:off x="6272414" y="4587593"/>
             <a:ext cx="727491" cy="276999"/>
           </a:xfrm>
           <a:prstGeom prst="rect">
@@ -5882,7 +5854,7 @@
         </p:nvSpPr>
         <p:spPr>
           <a:xfrm>
-            <a:off x="6272414" y="2608119"/>
+            <a:off x="6272414" y="2289467"/>
             <a:ext cx="727491" cy="276999"/>
           </a:xfrm>
           <a:prstGeom prst="rect">
@@ -5922,7 +5894,7 @@
         </p:nvSpPr>
         <p:spPr>
           <a:xfrm rot="5400000">
-            <a:off x="3430504" y="4462882"/>
+            <a:off x="3430504" y="4144230"/>
             <a:ext cx="1412189" cy="461665"/>
           </a:xfrm>
           <a:prstGeom prst="rect">
@@ -5973,7 +5945,7 @@
         </p:nvSpPr>
         <p:spPr>
           <a:xfrm rot="16200000">
-            <a:off x="2880934" y="4599217"/>
+            <a:off x="2880934" y="4280565"/>
             <a:ext cx="1412189" cy="276999"/>
           </a:xfrm>
           <a:prstGeom prst="rect">
@@ -6013,7 +5985,7 @@
         </p:nvGrpSpPr>
         <p:grpSpPr>
           <a:xfrm>
-            <a:off x="5772264" y="3059261"/>
+            <a:off x="5772264" y="2740609"/>
             <a:ext cx="1201564" cy="1201564"/>
             <a:chOff x="5772264" y="3059261"/>
             <a:chExt cx="1201564" cy="1201564"/>
@@ -6151,10 +6123,10 @@
         </p:nvGrpSpPr>
         <p:grpSpPr>
           <a:xfrm>
-            <a:off x="68320" y="2194079"/>
-            <a:ext cx="3354854" cy="2154816"/>
-            <a:chOff x="114040" y="2347385"/>
-            <a:chExt cx="3354854" cy="2001509"/>
+            <a:off x="20682" y="2384663"/>
+            <a:ext cx="3354854" cy="1856562"/>
+            <a:chOff x="66402" y="2383062"/>
+            <a:chExt cx="3354854" cy="1986962"/>
           </a:xfrm>
         </p:grpSpPr>
         <p:sp>
@@ -6223,8 +6195,8 @@
           </p:nvSpPr>
           <p:spPr>
             <a:xfrm>
-              <a:off x="114040" y="2347385"/>
-              <a:ext cx="3354854" cy="646331"/>
+              <a:off x="66402" y="4084144"/>
+              <a:ext cx="3354854" cy="285880"/>
             </a:xfrm>
             <a:prstGeom prst="rect">
               <a:avLst/>
@@ -6239,7 +6211,7 @@
             <a:p>
               <a:pPr algn="ctr"/>
               <a:r>
-                <a:rPr lang="en-GB" dirty="0">
+                <a:rPr lang="en-GB" sz="1400" i="1" dirty="0">
                   <a:solidFill>
                     <a:srgbClr val="FF0000"/>
                   </a:solidFill>
@@ -6247,17 +6219,6 @@
                 <a:t>Integration not considered</a:t>
               </a:r>
             </a:p>
-            <a:p>
-              <a:pPr algn="ctr"/>
-              <a:r>
-                <a:rPr lang="en-GB" dirty="0">
-                  <a:solidFill>
-                    <a:srgbClr val="FF0000"/>
-                  </a:solidFill>
-                </a:rPr>
-                <a:t>Faked/stubbed</a:t>
-              </a:r>
-            </a:p>
           </p:txBody>
         </p:sp>
       </p:grpSp>
@@ -6275,7 +6236,7 @@
         </p:nvSpPr>
         <p:spPr>
           <a:xfrm>
-            <a:off x="1829117" y="3610538"/>
+            <a:off x="1829117" y="3291886"/>
             <a:ext cx="1412189" cy="461665"/>
           </a:xfrm>
           <a:prstGeom prst="rect">
@@ -6326,7 +6287,7 @@
         </p:nvSpPr>
         <p:spPr>
           <a:xfrm>
-            <a:off x="1773114" y="3182114"/>
+            <a:off x="1773114" y="2863462"/>
             <a:ext cx="1412189" cy="276999"/>
           </a:xfrm>
           <a:prstGeom prst="rect">
@@ -6366,7 +6327,7 @@
         </p:nvGrpSpPr>
         <p:grpSpPr>
           <a:xfrm rot="7872069">
-            <a:off x="5015304" y="4327840"/>
+            <a:off x="5015304" y="4009188"/>
             <a:ext cx="445008" cy="1672583"/>
             <a:chOff x="4955538" y="4800600"/>
             <a:chExt cx="445008" cy="938328"/>
@@ -6467,7 +6428,7 @@
         </p:nvSpPr>
         <p:spPr>
           <a:xfrm rot="2546245">
-            <a:off x="4644388" y="4696960"/>
+            <a:off x="4644388" y="4378308"/>
             <a:ext cx="1412189" cy="276999"/>
           </a:xfrm>
           <a:prstGeom prst="rect">
@@ -6524,7 +6485,7 @@
         </p:blipFill>
         <p:spPr>
           <a:xfrm rot="2589622">
-            <a:off x="5595744" y="4958472"/>
+            <a:off x="5595744" y="4639820"/>
             <a:ext cx="276402" cy="276402"/>
           </a:xfrm>
           <a:prstGeom prst="rect">
@@ -6563,7 +6524,7 @@
         </p:blipFill>
         <p:spPr>
           <a:xfrm>
-            <a:off x="3243601" y="4589559"/>
+            <a:off x="3243601" y="4270907"/>
             <a:ext cx="276402" cy="276402"/>
           </a:xfrm>
           <a:prstGeom prst="rect">
@@ -6571,6 +6532,258 @@
           </a:prstGeom>
         </p:spPr>
       </p:pic>
+      <p:sp>
+        <p:nvSpPr>
+          <p:cNvPr id="3" name="Rektangel: et afrundet og et afklippet hjørne øverst 2">
+            <a:extLst>
+              <a:ext uri="{FF2B5EF4-FFF2-40B4-BE49-F238E27FC236}">
+                <a16:creationId xmlns:a16="http://schemas.microsoft.com/office/drawing/2014/main" id="{4D011713-876E-D491-ADFC-93A71886FE27}"/>
+              </a:ext>
+            </a:extLst>
+          </p:cNvPr>
+          <p:cNvSpPr/>
+          <p:nvPr/>
+        </p:nvSpPr>
+        <p:spPr>
+          <a:xfrm flipV="1">
+            <a:off x="272008" y="564732"/>
+            <a:ext cx="3058807" cy="333213"/>
+          </a:xfrm>
+          <a:prstGeom prst="snipRoundRect">
+            <a:avLst/>
+          </a:prstGeom>
+          <a:noFill/>
+        </p:spPr>
+        <p:style>
+          <a:lnRef idx="2">
+            <a:schemeClr val="accent1">
+              <a:shade val="15000"/>
+            </a:schemeClr>
+          </a:lnRef>
+          <a:fillRef idx="1">
+            <a:schemeClr val="accent1"/>
+          </a:fillRef>
+          <a:effectRef idx="0">
+            <a:schemeClr val="accent1"/>
+          </a:effectRef>
+          <a:fontRef idx="minor">
+            <a:schemeClr val="lt1"/>
+          </a:fontRef>
+        </p:style>
+        <p:txBody>
+          <a:bodyPr rtlCol="0" anchor="ctr"/>
+          <a:lstStyle/>
+          <a:p>
+            <a:pPr algn="ctr"/>
+            <a:endParaRPr lang="da-DK" dirty="0">
+              <a:solidFill>
+                <a:schemeClr val="tx1"/>
+              </a:solidFill>
+            </a:endParaRPr>
+          </a:p>
+        </p:txBody>
+      </p:sp>
+      <p:sp>
+        <p:nvSpPr>
+          <p:cNvPr id="6" name="Tekstfelt 5">
+            <a:extLst>
+              <a:ext uri="{FF2B5EF4-FFF2-40B4-BE49-F238E27FC236}">
+                <a16:creationId xmlns:a16="http://schemas.microsoft.com/office/drawing/2014/main" id="{AD6BEFB8-D9FD-F8A6-1192-9F1CF90434D7}"/>
+              </a:ext>
+            </a:extLst>
+          </p:cNvPr>
+          <p:cNvSpPr txBox="1"/>
+          <p:nvPr/>
+        </p:nvSpPr>
+        <p:spPr>
+          <a:xfrm>
+            <a:off x="299084" y="546673"/>
+            <a:ext cx="3154243" cy="307777"/>
+          </a:xfrm>
+          <a:prstGeom prst="rect">
+            <a:avLst/>
+          </a:prstGeom>
+          <a:noFill/>
+        </p:spPr>
+        <p:txBody>
+          <a:bodyPr wrap="square">
+            <a:spAutoFit/>
+          </a:bodyPr>
+          <a:lstStyle/>
+          <a:p>
+            <a:r>
+              <a:rPr lang="en-GB" sz="1400" dirty="0"/>
+              <a:t>Beyond Wishes Rich picture diagram</a:t>
+            </a:r>
+            <a:endParaRPr lang="da-DK" sz="1400" dirty="0"/>
+          </a:p>
+        </p:txBody>
+      </p:sp>
+      <p:grpSp>
+        <p:nvGrpSpPr>
+          <p:cNvPr id="8" name="Gruppe 7">
+            <a:extLst>
+              <a:ext uri="{FF2B5EF4-FFF2-40B4-BE49-F238E27FC236}">
+                <a16:creationId xmlns:a16="http://schemas.microsoft.com/office/drawing/2014/main" id="{AB68E377-F9C2-AFE1-218B-0FFCE8DB6310}"/>
+              </a:ext>
+            </a:extLst>
+          </p:cNvPr>
+          <p:cNvGrpSpPr/>
+          <p:nvPr/>
+        </p:nvGrpSpPr>
+        <p:grpSpPr>
+          <a:xfrm>
+            <a:off x="4343475" y="4241225"/>
+            <a:ext cx="3748367" cy="2421584"/>
+            <a:chOff x="146656" y="2383062"/>
+            <a:chExt cx="3354854" cy="2014764"/>
+          </a:xfrm>
+        </p:grpSpPr>
+        <p:sp>
+          <p:nvSpPr>
+            <p:cNvPr id="10" name="Rektangel 9">
+              <a:extLst>
+                <a:ext uri="{FF2B5EF4-FFF2-40B4-BE49-F238E27FC236}">
+                  <a16:creationId xmlns:a16="http://schemas.microsoft.com/office/drawing/2014/main" id="{5C1BAEE7-2557-B7C4-EA1D-C649D6279E1A}"/>
+                </a:ext>
+              </a:extLst>
+            </p:cNvPr>
+            <p:cNvSpPr/>
+            <p:nvPr/>
+          </p:nvSpPr>
+          <p:spPr>
+            <a:xfrm>
+              <a:off x="341352" y="2383062"/>
+              <a:ext cx="2830104" cy="1965832"/>
+            </a:xfrm>
+            <a:prstGeom prst="rect">
+              <a:avLst/>
+            </a:prstGeom>
+            <a:noFill/>
+            <a:ln>
+              <a:solidFill>
+                <a:srgbClr val="FF0000"/>
+              </a:solidFill>
+            </a:ln>
+          </p:spPr>
+          <p:style>
+            <a:lnRef idx="2">
+              <a:schemeClr val="accent1">
+                <a:shade val="15000"/>
+              </a:schemeClr>
+            </a:lnRef>
+            <a:fillRef idx="1">
+              <a:schemeClr val="accent1"/>
+            </a:fillRef>
+            <a:effectRef idx="0">
+              <a:schemeClr val="accent1"/>
+            </a:effectRef>
+            <a:fontRef idx="minor">
+              <a:schemeClr val="lt1"/>
+            </a:fontRef>
+          </p:style>
+          <p:txBody>
+            <a:bodyPr rtlCol="0" anchor="ctr"/>
+            <a:lstStyle/>
+            <a:p>
+              <a:pPr algn="ctr"/>
+              <a:endParaRPr lang="da-DK"/>
+            </a:p>
+          </p:txBody>
+        </p:sp>
+        <p:sp>
+          <p:nvSpPr>
+            <p:cNvPr id="12" name="Tekstfelt 11">
+              <a:extLst>
+                <a:ext uri="{FF2B5EF4-FFF2-40B4-BE49-F238E27FC236}">
+                  <a16:creationId xmlns:a16="http://schemas.microsoft.com/office/drawing/2014/main" id="{BF36C377-D63C-6162-F589-72A8B10354FB}"/>
+                </a:ext>
+              </a:extLst>
+            </p:cNvPr>
+            <p:cNvSpPr txBox="1"/>
+            <p:nvPr/>
+          </p:nvSpPr>
+          <p:spPr>
+            <a:xfrm>
+              <a:off x="146656" y="4141755"/>
+              <a:ext cx="3354854" cy="256071"/>
+            </a:xfrm>
+            <a:prstGeom prst="rect">
+              <a:avLst/>
+            </a:prstGeom>
+            <a:noFill/>
+          </p:spPr>
+          <p:txBody>
+            <a:bodyPr wrap="square">
+              <a:spAutoFit/>
+            </a:bodyPr>
+            <a:lstStyle/>
+            <a:p>
+              <a:pPr algn="ctr"/>
+              <a:r>
+                <a:rPr lang="en-GB" sz="1400" i="1" dirty="0">
+                  <a:solidFill>
+                    <a:srgbClr val="FF0000"/>
+                  </a:solidFill>
+                </a:rPr>
+                <a:t>Multi-instance not implemented</a:t>
+              </a:r>
+            </a:p>
+          </p:txBody>
+        </p:sp>
+      </p:grpSp>
+      <p:sp>
+        <p:nvSpPr>
+          <p:cNvPr id="14" name="Rektangel 13">
+            <a:extLst>
+              <a:ext uri="{FF2B5EF4-FFF2-40B4-BE49-F238E27FC236}">
+                <a16:creationId xmlns:a16="http://schemas.microsoft.com/office/drawing/2014/main" id="{FB72430C-8DF8-DD4E-8AD5-ACD071A3C741}"/>
+              </a:ext>
+            </a:extLst>
+          </p:cNvPr>
+          <p:cNvSpPr/>
+          <p:nvPr/>
+        </p:nvSpPr>
+        <p:spPr>
+          <a:xfrm>
+            <a:off x="272009" y="564733"/>
+            <a:ext cx="11554231" cy="6178967"/>
+          </a:xfrm>
+          <a:prstGeom prst="rect">
+            <a:avLst/>
+          </a:prstGeom>
+          <a:noFill/>
+          <a:ln>
+            <a:solidFill>
+              <a:schemeClr val="tx1"/>
+            </a:solidFill>
+          </a:ln>
+        </p:spPr>
+        <p:style>
+          <a:lnRef idx="2">
+            <a:schemeClr val="accent1">
+              <a:shade val="15000"/>
+            </a:schemeClr>
+          </a:lnRef>
+          <a:fillRef idx="1">
+            <a:schemeClr val="accent1"/>
+          </a:fillRef>
+          <a:effectRef idx="0">
+            <a:schemeClr val="accent1"/>
+          </a:effectRef>
+          <a:fontRef idx="minor">
+            <a:schemeClr val="lt1"/>
+          </a:fontRef>
+        </p:style>
+        <p:txBody>
+          <a:bodyPr rtlCol="0" anchor="ctr"/>
+          <a:lstStyle/>
+          <a:p>
+            <a:pPr algn="ctr"/>
+            <a:endParaRPr lang="da-DK"/>
+          </a:p>
+        </p:txBody>
+      </p:sp>
     </p:spTree>
     <p:extLst>
       <p:ext uri="{BB962C8B-B14F-4D97-AF65-F5344CB8AC3E}">
@@ -7681,7 +7894,7 @@
         </p:blipFill>
         <p:spPr bwMode="auto">
           <a:xfrm>
-            <a:off x="286974" y="1929429"/>
+            <a:off x="286974" y="128061"/>
             <a:ext cx="11618052" cy="4645709"/>
           </a:xfrm>
           <a:prstGeom prst="rect">
@@ -7703,6 +7916,921 @@
     <p:extLst>
       <p:ext uri="{BB962C8B-B14F-4D97-AF65-F5344CB8AC3E}">
         <p14:creationId xmlns:p14="http://schemas.microsoft.com/office/powerpoint/2010/main" val="1337074046"/>
+      </p:ext>
+    </p:extLst>
+  </p:cSld>
+  <p:clrMapOvr>
+    <a:masterClrMapping/>
+  </p:clrMapOvr>
+</p:sld>
+</file>
+
+<file path=ppt/slides/slide8.xml><?xml version="1.0" encoding="utf-8"?>
+<p:sld xmlns:a="http://schemas.openxmlformats.org/drawingml/2006/main" xmlns:r="http://schemas.openxmlformats.org/officeDocument/2006/relationships" xmlns:p="http://schemas.openxmlformats.org/presentationml/2006/main">
+  <p:cSld>
+    <p:spTree>
+      <p:nvGrpSpPr>
+        <p:cNvPr id="1" name=""/>
+        <p:cNvGrpSpPr/>
+        <p:nvPr/>
+      </p:nvGrpSpPr>
+      <p:grpSpPr>
+        <a:xfrm>
+          <a:off x="0" y="0"/>
+          <a:ext cx="0" cy="0"/>
+          <a:chOff x="0" y="0"/>
+          <a:chExt cx="0" cy="0"/>
+        </a:xfrm>
+      </p:grpSpPr>
+      <p:sp>
+        <p:nvSpPr>
+          <p:cNvPr id="13" name="Tekstfelt 12">
+            <a:extLst>
+              <a:ext uri="{FF2B5EF4-FFF2-40B4-BE49-F238E27FC236}">
+                <a16:creationId xmlns:a16="http://schemas.microsoft.com/office/drawing/2014/main" id="{04FB4BDF-CDA3-DD82-49D2-B24D73E12D2D}"/>
+              </a:ext>
+            </a:extLst>
+          </p:cNvPr>
+          <p:cNvSpPr txBox="1"/>
+          <p:nvPr/>
+        </p:nvSpPr>
+        <p:spPr>
+          <a:xfrm>
+            <a:off x="3497179" y="2370964"/>
+            <a:ext cx="1729983" cy="307777"/>
+          </a:xfrm>
+          <a:prstGeom prst="rect">
+            <a:avLst/>
+          </a:prstGeom>
+          <a:noFill/>
+        </p:spPr>
+        <p:txBody>
+          <a:bodyPr wrap="square" rtlCol="0">
+            <a:spAutoFit/>
+          </a:bodyPr>
+          <a:lstStyle/>
+          <a:p>
+            <a:r>
+              <a:rPr lang="en-GB" sz="1400" dirty="0"/>
+              <a:t>HTTP Fetch</a:t>
+            </a:r>
+            <a:endParaRPr lang="da-DK" sz="1400" dirty="0"/>
+          </a:p>
+        </p:txBody>
+      </p:sp>
+      <p:pic>
+        <p:nvPicPr>
+          <p:cNvPr id="16" name="Grafik 15" descr="Overførsel kontur">
+            <a:extLst>
+              <a:ext uri="{FF2B5EF4-FFF2-40B4-BE49-F238E27FC236}">
+                <a16:creationId xmlns:a16="http://schemas.microsoft.com/office/drawing/2014/main" id="{698773C2-0AB0-8E37-2D22-13823C09E6E3}"/>
+              </a:ext>
+            </a:extLst>
+          </p:cNvPr>
+          <p:cNvPicPr>
+            <a:picLocks noChangeAspect="1"/>
+          </p:cNvPicPr>
+          <p:nvPr/>
+        </p:nvPicPr>
+        <p:blipFill>
+          <a:blip r:embed="rId2">
+            <a:extLst>
+              <a:ext uri="{28A0092B-C50C-407E-A947-70E740481C1C}">
+                <a14:useLocalDpi xmlns:a14="http://schemas.microsoft.com/office/drawing/2010/main" val="0"/>
+              </a:ext>
+              <a:ext uri="{96DAC541-7B7A-43D3-8B79-37D633B846F1}">
+                <asvg:svgBlip xmlns:asvg="http://schemas.microsoft.com/office/drawing/2016/SVG/main" r:embed="rId3"/>
+              </a:ext>
+            </a:extLst>
+          </a:blip>
+          <a:stretch>
+            <a:fillRect/>
+          </a:stretch>
+        </p:blipFill>
+        <p:spPr>
+          <a:xfrm flipH="1">
+            <a:off x="7447786" y="2368297"/>
+            <a:ext cx="1863444" cy="914400"/>
+          </a:xfrm>
+          <a:prstGeom prst="rect">
+            <a:avLst/>
+          </a:prstGeom>
+        </p:spPr>
+      </p:pic>
+      <p:sp>
+        <p:nvSpPr>
+          <p:cNvPr id="20" name="Tekstfelt 19">
+            <a:extLst>
+              <a:ext uri="{FF2B5EF4-FFF2-40B4-BE49-F238E27FC236}">
+                <a16:creationId xmlns:a16="http://schemas.microsoft.com/office/drawing/2014/main" id="{72809DD9-955E-F7EE-0BBD-82D95EFEDDCE}"/>
+              </a:ext>
+            </a:extLst>
+          </p:cNvPr>
+          <p:cNvSpPr txBox="1"/>
+          <p:nvPr/>
+        </p:nvSpPr>
+        <p:spPr>
+          <a:xfrm>
+            <a:off x="7640930" y="2398158"/>
+            <a:ext cx="1286141" cy="307777"/>
+          </a:xfrm>
+          <a:prstGeom prst="rect">
+            <a:avLst/>
+          </a:prstGeom>
+          <a:noFill/>
+        </p:spPr>
+        <p:txBody>
+          <a:bodyPr wrap="square">
+            <a:spAutoFit/>
+          </a:bodyPr>
+          <a:lstStyle/>
+          <a:p>
+            <a:r>
+              <a:rPr lang="da-DK" sz="1400" dirty="0"/>
+              <a:t>HTTP ”CRUD” </a:t>
+            </a:r>
+          </a:p>
+        </p:txBody>
+      </p:sp>
+      <p:sp>
+        <p:nvSpPr>
+          <p:cNvPr id="21" name="Rektangel 20">
+            <a:extLst>
+              <a:ext uri="{FF2B5EF4-FFF2-40B4-BE49-F238E27FC236}">
+                <a16:creationId xmlns:a16="http://schemas.microsoft.com/office/drawing/2014/main" id="{6BAB62A3-0D8F-063A-A0C6-DD5E3A93B4BA}"/>
+              </a:ext>
+            </a:extLst>
+          </p:cNvPr>
+          <p:cNvSpPr/>
+          <p:nvPr/>
+        </p:nvSpPr>
+        <p:spPr>
+          <a:xfrm>
+            <a:off x="1053432" y="4322449"/>
+            <a:ext cx="1842516" cy="932688"/>
+          </a:xfrm>
+          <a:prstGeom prst="rect">
+            <a:avLst/>
+          </a:prstGeom>
+          <a:solidFill>
+            <a:schemeClr val="accent4"/>
+          </a:solidFill>
+        </p:spPr>
+        <p:style>
+          <a:lnRef idx="2">
+            <a:schemeClr val="accent1">
+              <a:shade val="15000"/>
+            </a:schemeClr>
+          </a:lnRef>
+          <a:fillRef idx="1">
+            <a:schemeClr val="accent1"/>
+          </a:fillRef>
+          <a:effectRef idx="0">
+            <a:schemeClr val="accent1"/>
+          </a:effectRef>
+          <a:fontRef idx="minor">
+            <a:schemeClr val="lt1"/>
+          </a:fontRef>
+        </p:style>
+        <p:txBody>
+          <a:bodyPr rtlCol="0" anchor="ctr"/>
+          <a:lstStyle/>
+          <a:p>
+            <a:pPr algn="ctr"/>
+            <a:r>
+              <a:rPr lang="en-GB" dirty="0"/>
+              <a:t>Client logic</a:t>
+            </a:r>
+          </a:p>
+          <a:p>
+            <a:pPr algn="ctr"/>
+            <a:r>
+              <a:rPr lang="en-GB" dirty="0"/>
+              <a:t>JavaScript</a:t>
+            </a:r>
+            <a:endParaRPr lang="da-DK" dirty="0"/>
+          </a:p>
+        </p:txBody>
+      </p:sp>
+      <p:cxnSp>
+        <p:nvCxnSpPr>
+          <p:cNvPr id="24" name="Lige pilforbindelse 23">
+            <a:extLst>
+              <a:ext uri="{FF2B5EF4-FFF2-40B4-BE49-F238E27FC236}">
+                <a16:creationId xmlns:a16="http://schemas.microsoft.com/office/drawing/2014/main" id="{3C792CAB-56AD-5E5C-700C-53941FF87637}"/>
+              </a:ext>
+            </a:extLst>
+          </p:cNvPr>
+          <p:cNvCxnSpPr>
+            <a:cxnSpLocks/>
+            <a:stCxn id="21" idx="0"/>
+          </p:cNvCxnSpPr>
+          <p:nvPr/>
+        </p:nvCxnSpPr>
+        <p:spPr>
+          <a:xfrm flipV="1">
+            <a:off x="1974690" y="3594746"/>
+            <a:ext cx="0" cy="727703"/>
+          </a:xfrm>
+          <a:prstGeom prst="straightConnector1">
+            <a:avLst/>
+          </a:prstGeom>
+          <a:ln w="28575">
+            <a:solidFill>
+              <a:schemeClr val="tx1"/>
+            </a:solidFill>
+            <a:prstDash val="sysDot"/>
+            <a:tailEnd type="arrow" w="lg" len="lg"/>
+          </a:ln>
+        </p:spPr>
+        <p:style>
+          <a:lnRef idx="2">
+            <a:schemeClr val="accent1"/>
+          </a:lnRef>
+          <a:fillRef idx="0">
+            <a:schemeClr val="accent1"/>
+          </a:fillRef>
+          <a:effectRef idx="1">
+            <a:schemeClr val="accent1"/>
+          </a:effectRef>
+          <a:fontRef idx="minor">
+            <a:schemeClr val="tx1"/>
+          </a:fontRef>
+        </p:style>
+      </p:cxnSp>
+      <p:pic>
+        <p:nvPicPr>
+          <p:cNvPr id="30" name="Grafik 29" descr="Overførsel kontur">
+            <a:extLst>
+              <a:ext uri="{FF2B5EF4-FFF2-40B4-BE49-F238E27FC236}">
+                <a16:creationId xmlns:a16="http://schemas.microsoft.com/office/drawing/2014/main" id="{A8E33096-7212-96CA-54A3-075FEF53B9A4}"/>
+              </a:ext>
+            </a:extLst>
+          </p:cNvPr>
+          <p:cNvPicPr>
+            <a:picLocks noChangeAspect="1"/>
+          </p:cNvPicPr>
+          <p:nvPr/>
+        </p:nvPicPr>
+        <p:blipFill>
+          <a:blip r:embed="rId2">
+            <a:extLst>
+              <a:ext uri="{28A0092B-C50C-407E-A947-70E740481C1C}">
+                <a14:useLocalDpi xmlns:a14="http://schemas.microsoft.com/office/drawing/2010/main" val="0"/>
+              </a:ext>
+              <a:ext uri="{96DAC541-7B7A-43D3-8B79-37D633B846F1}">
+                <asvg:svgBlip xmlns:asvg="http://schemas.microsoft.com/office/drawing/2016/SVG/main" r:embed="rId3"/>
+              </a:ext>
+            </a:extLst>
+          </a:blip>
+          <a:stretch>
+            <a:fillRect/>
+          </a:stretch>
+        </p:blipFill>
+        <p:spPr>
+          <a:xfrm flipH="1">
+            <a:off x="3207282" y="2336292"/>
+            <a:ext cx="1863444" cy="914400"/>
+          </a:xfrm>
+          <a:prstGeom prst="rect">
+            <a:avLst/>
+          </a:prstGeom>
+        </p:spPr>
+      </p:pic>
+      <p:sp>
+        <p:nvSpPr>
+          <p:cNvPr id="33" name="Tekstfelt 32">
+            <a:extLst>
+              <a:ext uri="{FF2B5EF4-FFF2-40B4-BE49-F238E27FC236}">
+                <a16:creationId xmlns:a16="http://schemas.microsoft.com/office/drawing/2014/main" id="{B3F6BBC5-9188-E7E1-C5F0-E8EA8808DC1B}"/>
+              </a:ext>
+            </a:extLst>
+          </p:cNvPr>
+          <p:cNvSpPr txBox="1"/>
+          <p:nvPr/>
+        </p:nvSpPr>
+        <p:spPr>
+          <a:xfrm>
+            <a:off x="3636074" y="2917515"/>
+            <a:ext cx="1729983" cy="307777"/>
+          </a:xfrm>
+          <a:prstGeom prst="rect">
+            <a:avLst/>
+          </a:prstGeom>
+          <a:noFill/>
+        </p:spPr>
+        <p:txBody>
+          <a:bodyPr wrap="square" rtlCol="0">
+            <a:spAutoFit/>
+          </a:bodyPr>
+          <a:lstStyle/>
+          <a:p>
+            <a:r>
+              <a:rPr lang="en-GB" sz="1400" dirty="0"/>
+              <a:t>Return JSON</a:t>
+            </a:r>
+            <a:endParaRPr lang="da-DK" sz="1400" dirty="0"/>
+          </a:p>
+        </p:txBody>
+      </p:sp>
+      <p:sp>
+        <p:nvSpPr>
+          <p:cNvPr id="34" name="Tekstfelt 33">
+            <a:extLst>
+              <a:ext uri="{FF2B5EF4-FFF2-40B4-BE49-F238E27FC236}">
+                <a16:creationId xmlns:a16="http://schemas.microsoft.com/office/drawing/2014/main" id="{7C86F532-10FC-43D3-CB9C-2046CDBBAC26}"/>
+              </a:ext>
+            </a:extLst>
+          </p:cNvPr>
+          <p:cNvSpPr txBox="1"/>
+          <p:nvPr/>
+        </p:nvSpPr>
+        <p:spPr>
+          <a:xfrm>
+            <a:off x="7857789" y="2941722"/>
+            <a:ext cx="1729983" cy="307777"/>
+          </a:xfrm>
+          <a:prstGeom prst="rect">
+            <a:avLst/>
+          </a:prstGeom>
+          <a:noFill/>
+        </p:spPr>
+        <p:txBody>
+          <a:bodyPr wrap="square" rtlCol="0">
+            <a:spAutoFit/>
+          </a:bodyPr>
+          <a:lstStyle/>
+          <a:p>
+            <a:r>
+              <a:rPr lang="en-GB" sz="1400" dirty="0"/>
+              <a:t>HTTP Response</a:t>
+            </a:r>
+            <a:endParaRPr lang="da-DK" sz="1400" dirty="0"/>
+          </a:p>
+        </p:txBody>
+      </p:sp>
+      <p:sp>
+        <p:nvSpPr>
+          <p:cNvPr id="35" name="Rektangel 34">
+            <a:extLst>
+              <a:ext uri="{FF2B5EF4-FFF2-40B4-BE49-F238E27FC236}">
+                <a16:creationId xmlns:a16="http://schemas.microsoft.com/office/drawing/2014/main" id="{3AFB375D-2E70-2DAF-D33E-69EC72581BC8}"/>
+              </a:ext>
+            </a:extLst>
+          </p:cNvPr>
+          <p:cNvSpPr/>
+          <p:nvPr/>
+        </p:nvSpPr>
+        <p:spPr>
+          <a:xfrm>
+            <a:off x="729673" y="1717964"/>
+            <a:ext cx="11000509" cy="3842327"/>
+          </a:xfrm>
+          <a:prstGeom prst="rect">
+            <a:avLst/>
+          </a:prstGeom>
+          <a:noFill/>
+          <a:ln>
+            <a:solidFill>
+              <a:schemeClr val="tx1"/>
+            </a:solidFill>
+          </a:ln>
+        </p:spPr>
+        <p:style>
+          <a:lnRef idx="2">
+            <a:schemeClr val="accent1">
+              <a:shade val="15000"/>
+            </a:schemeClr>
+          </a:lnRef>
+          <a:fillRef idx="1">
+            <a:schemeClr val="accent1"/>
+          </a:fillRef>
+          <a:effectRef idx="0">
+            <a:schemeClr val="accent1"/>
+          </a:effectRef>
+          <a:fontRef idx="minor">
+            <a:schemeClr val="lt1"/>
+          </a:fontRef>
+        </p:style>
+        <p:txBody>
+          <a:bodyPr rtlCol="0" anchor="ctr"/>
+          <a:lstStyle/>
+          <a:p>
+            <a:pPr algn="ctr"/>
+            <a:endParaRPr lang="da-DK"/>
+          </a:p>
+        </p:txBody>
+      </p:sp>
+      <p:sp>
+        <p:nvSpPr>
+          <p:cNvPr id="37" name="Rektangel: et afrundet og et afklippet hjørne øverst 36">
+            <a:extLst>
+              <a:ext uri="{FF2B5EF4-FFF2-40B4-BE49-F238E27FC236}">
+                <a16:creationId xmlns:a16="http://schemas.microsoft.com/office/drawing/2014/main" id="{C68861E9-48AC-0AD2-9DFF-C1C9EFC956FA}"/>
+              </a:ext>
+            </a:extLst>
+          </p:cNvPr>
+          <p:cNvSpPr/>
+          <p:nvPr/>
+        </p:nvSpPr>
+        <p:spPr>
+          <a:xfrm flipV="1">
+            <a:off x="729673" y="1716863"/>
+            <a:ext cx="2373708" cy="333213"/>
+          </a:xfrm>
+          <a:prstGeom prst="snipRoundRect">
+            <a:avLst/>
+          </a:prstGeom>
+          <a:noFill/>
+        </p:spPr>
+        <p:style>
+          <a:lnRef idx="2">
+            <a:schemeClr val="accent1">
+              <a:shade val="15000"/>
+            </a:schemeClr>
+          </a:lnRef>
+          <a:fillRef idx="1">
+            <a:schemeClr val="accent1"/>
+          </a:fillRef>
+          <a:effectRef idx="0">
+            <a:schemeClr val="accent1"/>
+          </a:effectRef>
+          <a:fontRef idx="minor">
+            <a:schemeClr val="lt1"/>
+          </a:fontRef>
+        </p:style>
+        <p:txBody>
+          <a:bodyPr rtlCol="0" anchor="ctr"/>
+          <a:lstStyle/>
+          <a:p>
+            <a:pPr algn="ctr"/>
+            <a:endParaRPr lang="da-DK" dirty="0">
+              <a:solidFill>
+                <a:schemeClr val="tx1"/>
+              </a:solidFill>
+            </a:endParaRPr>
+          </a:p>
+        </p:txBody>
+      </p:sp>
+      <p:sp>
+        <p:nvSpPr>
+          <p:cNvPr id="38" name="Tekstfelt 37">
+            <a:extLst>
+              <a:ext uri="{FF2B5EF4-FFF2-40B4-BE49-F238E27FC236}">
+                <a16:creationId xmlns:a16="http://schemas.microsoft.com/office/drawing/2014/main" id="{E6B02D0C-108C-A35B-5F6E-3886810F2DFA}"/>
+              </a:ext>
+            </a:extLst>
+          </p:cNvPr>
+          <p:cNvSpPr txBox="1"/>
+          <p:nvPr/>
+        </p:nvSpPr>
+        <p:spPr>
+          <a:xfrm>
+            <a:off x="729673" y="1714476"/>
+            <a:ext cx="2373708" cy="307777"/>
+          </a:xfrm>
+          <a:prstGeom prst="rect">
+            <a:avLst/>
+          </a:prstGeom>
+          <a:noFill/>
+        </p:spPr>
+        <p:txBody>
+          <a:bodyPr wrap="square" rtlCol="0">
+            <a:spAutoFit/>
+          </a:bodyPr>
+          <a:lstStyle/>
+          <a:p>
+            <a:r>
+              <a:rPr lang="en-GB" sz="1400" dirty="0"/>
+              <a:t>Beyond Wishes Deployment </a:t>
+            </a:r>
+            <a:endParaRPr lang="da-DK" sz="1400" dirty="0"/>
+          </a:p>
+        </p:txBody>
+      </p:sp>
+      <p:sp>
+        <p:nvSpPr>
+          <p:cNvPr id="39" name="Kube 38">
+            <a:extLst>
+              <a:ext uri="{FF2B5EF4-FFF2-40B4-BE49-F238E27FC236}">
+                <a16:creationId xmlns:a16="http://schemas.microsoft.com/office/drawing/2014/main" id="{8A08548F-6B44-FE7F-C33D-59D138694F44}"/>
+              </a:ext>
+            </a:extLst>
+          </p:cNvPr>
+          <p:cNvSpPr/>
+          <p:nvPr/>
+        </p:nvSpPr>
+        <p:spPr>
+          <a:xfrm>
+            <a:off x="9738838" y="2160225"/>
+            <a:ext cx="1597351" cy="1330544"/>
+          </a:xfrm>
+          <a:prstGeom prst="cube">
+            <a:avLst/>
+          </a:prstGeom>
+        </p:spPr>
+        <p:style>
+          <a:lnRef idx="2">
+            <a:schemeClr val="accent1">
+              <a:shade val="15000"/>
+            </a:schemeClr>
+          </a:lnRef>
+          <a:fillRef idx="1">
+            <a:schemeClr val="accent1"/>
+          </a:fillRef>
+          <a:effectRef idx="0">
+            <a:schemeClr val="accent1"/>
+          </a:effectRef>
+          <a:fontRef idx="minor">
+            <a:schemeClr val="lt1"/>
+          </a:fontRef>
+        </p:style>
+        <p:txBody>
+          <a:bodyPr rtlCol="0" anchor="ctr"/>
+          <a:lstStyle/>
+          <a:p>
+            <a:pPr algn="ctr"/>
+            <a:r>
+              <a:rPr lang="en-GB" dirty="0"/>
+              <a:t>CouchDB</a:t>
+            </a:r>
+          </a:p>
+          <a:p>
+            <a:pPr algn="ctr"/>
+            <a:r>
+              <a:rPr lang="en-GB" dirty="0"/>
+              <a:t>Python</a:t>
+            </a:r>
+          </a:p>
+        </p:txBody>
+      </p:sp>
+      <p:sp>
+        <p:nvSpPr>
+          <p:cNvPr id="40" name="Kube 39">
+            <a:extLst>
+              <a:ext uri="{FF2B5EF4-FFF2-40B4-BE49-F238E27FC236}">
+                <a16:creationId xmlns:a16="http://schemas.microsoft.com/office/drawing/2014/main" id="{8469DBA0-ACDA-4071-AF94-DD3A1D009458}"/>
+              </a:ext>
+            </a:extLst>
+          </p:cNvPr>
+          <p:cNvSpPr/>
+          <p:nvPr/>
+        </p:nvSpPr>
+        <p:spPr>
+          <a:xfrm>
+            <a:off x="5470851" y="2233306"/>
+            <a:ext cx="1597351" cy="1330544"/>
+          </a:xfrm>
+          <a:prstGeom prst="cube">
+            <a:avLst/>
+          </a:prstGeom>
+        </p:spPr>
+        <p:style>
+          <a:lnRef idx="2">
+            <a:schemeClr val="accent1">
+              <a:shade val="15000"/>
+            </a:schemeClr>
+          </a:lnRef>
+          <a:fillRef idx="1">
+            <a:schemeClr val="accent1"/>
+          </a:fillRef>
+          <a:effectRef idx="0">
+            <a:schemeClr val="accent1"/>
+          </a:effectRef>
+          <a:fontRef idx="minor">
+            <a:schemeClr val="lt1"/>
+          </a:fontRef>
+        </p:style>
+        <p:txBody>
+          <a:bodyPr rtlCol="0" anchor="ctr"/>
+          <a:lstStyle/>
+          <a:p>
+            <a:pPr algn="ctr"/>
+            <a:r>
+              <a:rPr lang="en-GB" dirty="0"/>
+              <a:t>FastAPI</a:t>
+            </a:r>
+          </a:p>
+          <a:p>
+            <a:pPr algn="ctr"/>
+            <a:r>
+              <a:rPr lang="en-GB" dirty="0"/>
+              <a:t>Python</a:t>
+            </a:r>
+          </a:p>
+        </p:txBody>
+      </p:sp>
+      <p:sp>
+        <p:nvSpPr>
+          <p:cNvPr id="41" name="Kube 40">
+            <a:extLst>
+              <a:ext uri="{FF2B5EF4-FFF2-40B4-BE49-F238E27FC236}">
+                <a16:creationId xmlns:a16="http://schemas.microsoft.com/office/drawing/2014/main" id="{CB71C266-719D-0A2B-25B5-94E6542B4DD1}"/>
+              </a:ext>
+            </a:extLst>
+          </p:cNvPr>
+          <p:cNvSpPr/>
+          <p:nvPr/>
+        </p:nvSpPr>
+        <p:spPr>
+          <a:xfrm>
+            <a:off x="1181968" y="2239733"/>
+            <a:ext cx="1729983" cy="1330544"/>
+          </a:xfrm>
+          <a:prstGeom prst="cube">
+            <a:avLst/>
+          </a:prstGeom>
+          <a:solidFill>
+            <a:schemeClr val="accent4"/>
+          </a:solidFill>
+        </p:spPr>
+        <p:style>
+          <a:lnRef idx="2">
+            <a:schemeClr val="accent1">
+              <a:shade val="15000"/>
+            </a:schemeClr>
+          </a:lnRef>
+          <a:fillRef idx="1">
+            <a:schemeClr val="accent1"/>
+          </a:fillRef>
+          <a:effectRef idx="0">
+            <a:schemeClr val="accent1"/>
+          </a:effectRef>
+          <a:fontRef idx="minor">
+            <a:schemeClr val="lt1"/>
+          </a:fontRef>
+        </p:style>
+        <p:txBody>
+          <a:bodyPr rtlCol="0" anchor="ctr"/>
+          <a:lstStyle/>
+          <a:p>
+            <a:pPr algn="ctr"/>
+            <a:r>
+              <a:rPr lang="en-GB" dirty="0"/>
+              <a:t>Client</a:t>
+            </a:r>
+          </a:p>
+          <a:p>
+            <a:pPr algn="ctr"/>
+            <a:r>
+              <a:rPr lang="en-GB" dirty="0"/>
+              <a:t>Front-End</a:t>
+            </a:r>
+          </a:p>
+          <a:p>
+            <a:pPr algn="ctr"/>
+            <a:r>
+              <a:rPr lang="en-GB" dirty="0"/>
+              <a:t>CSS, HTML</a:t>
+            </a:r>
+            <a:endParaRPr lang="da-DK" dirty="0"/>
+          </a:p>
+        </p:txBody>
+      </p:sp>
+      <p:sp>
+        <p:nvSpPr>
+          <p:cNvPr id="44" name="Rutediagram: Forbindelse 43">
+            <a:extLst>
+              <a:ext uri="{FF2B5EF4-FFF2-40B4-BE49-F238E27FC236}">
+                <a16:creationId xmlns:a16="http://schemas.microsoft.com/office/drawing/2014/main" id="{864A28C5-3FF4-15A2-153E-98FF058ABBC3}"/>
+              </a:ext>
+            </a:extLst>
+          </p:cNvPr>
+          <p:cNvSpPr/>
+          <p:nvPr/>
+        </p:nvSpPr>
+        <p:spPr>
+          <a:xfrm>
+            <a:off x="890607" y="3758040"/>
+            <a:ext cx="415636" cy="425577"/>
+          </a:xfrm>
+          <a:prstGeom prst="flowChartConnector">
+            <a:avLst/>
+          </a:prstGeom>
+          <a:solidFill>
+            <a:schemeClr val="accent3">
+              <a:lumMod val="75000"/>
+            </a:schemeClr>
+          </a:solidFill>
+          <a:ln>
+            <a:solidFill>
+              <a:schemeClr val="tx1"/>
+            </a:solidFill>
+          </a:ln>
+        </p:spPr>
+        <p:style>
+          <a:lnRef idx="2">
+            <a:schemeClr val="accent1">
+              <a:shade val="15000"/>
+            </a:schemeClr>
+          </a:lnRef>
+          <a:fillRef idx="1">
+            <a:schemeClr val="accent1"/>
+          </a:fillRef>
+          <a:effectRef idx="0">
+            <a:schemeClr val="accent1"/>
+          </a:effectRef>
+          <a:fontRef idx="minor">
+            <a:schemeClr val="lt1"/>
+          </a:fontRef>
+        </p:style>
+        <p:txBody>
+          <a:bodyPr rtlCol="0" anchor="ctr"/>
+          <a:lstStyle/>
+          <a:p>
+            <a:pPr algn="ctr"/>
+            <a:r>
+              <a:rPr lang="en-GB" dirty="0"/>
+              <a:t>1</a:t>
+            </a:r>
+            <a:endParaRPr lang="da-DK" dirty="0"/>
+          </a:p>
+        </p:txBody>
+      </p:sp>
+      <p:sp>
+        <p:nvSpPr>
+          <p:cNvPr id="45" name="Rutediagram: Forbindelse 44">
+            <a:extLst>
+              <a:ext uri="{FF2B5EF4-FFF2-40B4-BE49-F238E27FC236}">
+                <a16:creationId xmlns:a16="http://schemas.microsoft.com/office/drawing/2014/main" id="{A3F81ECC-BA16-20FC-3CC8-BDBF400AF547}"/>
+              </a:ext>
+            </a:extLst>
+          </p:cNvPr>
+          <p:cNvSpPr/>
+          <p:nvPr/>
+        </p:nvSpPr>
+        <p:spPr>
+          <a:xfrm>
+            <a:off x="3428256" y="1960669"/>
+            <a:ext cx="415636" cy="425577"/>
+          </a:xfrm>
+          <a:prstGeom prst="flowChartConnector">
+            <a:avLst/>
+          </a:prstGeom>
+          <a:solidFill>
+            <a:schemeClr val="accent3">
+              <a:lumMod val="75000"/>
+            </a:schemeClr>
+          </a:solidFill>
+          <a:ln>
+            <a:solidFill>
+              <a:schemeClr val="tx1"/>
+            </a:solidFill>
+          </a:ln>
+        </p:spPr>
+        <p:style>
+          <a:lnRef idx="2">
+            <a:schemeClr val="accent1">
+              <a:shade val="15000"/>
+            </a:schemeClr>
+          </a:lnRef>
+          <a:fillRef idx="1">
+            <a:schemeClr val="accent1"/>
+          </a:fillRef>
+          <a:effectRef idx="0">
+            <a:schemeClr val="accent1"/>
+          </a:effectRef>
+          <a:fontRef idx="minor">
+            <a:schemeClr val="lt1"/>
+          </a:fontRef>
+        </p:style>
+        <p:txBody>
+          <a:bodyPr rtlCol="0" anchor="ctr"/>
+          <a:lstStyle/>
+          <a:p>
+            <a:pPr algn="ctr"/>
+            <a:r>
+              <a:rPr lang="en-GB" dirty="0"/>
+              <a:t>2</a:t>
+            </a:r>
+            <a:endParaRPr lang="da-DK" dirty="0"/>
+          </a:p>
+        </p:txBody>
+      </p:sp>
+      <p:sp>
+        <p:nvSpPr>
+          <p:cNvPr id="46" name="Rutediagram: Forbindelse 45">
+            <a:extLst>
+              <a:ext uri="{FF2B5EF4-FFF2-40B4-BE49-F238E27FC236}">
+                <a16:creationId xmlns:a16="http://schemas.microsoft.com/office/drawing/2014/main" id="{C82BA772-1E22-C387-AE62-36FA47F2513A}"/>
+              </a:ext>
+            </a:extLst>
+          </p:cNvPr>
+          <p:cNvSpPr/>
+          <p:nvPr/>
+        </p:nvSpPr>
+        <p:spPr>
+          <a:xfrm>
+            <a:off x="7330347" y="2004823"/>
+            <a:ext cx="415636" cy="425577"/>
+          </a:xfrm>
+          <a:prstGeom prst="flowChartConnector">
+            <a:avLst/>
+          </a:prstGeom>
+          <a:solidFill>
+            <a:schemeClr val="accent3">
+              <a:lumMod val="75000"/>
+            </a:schemeClr>
+          </a:solidFill>
+          <a:ln>
+            <a:solidFill>
+              <a:schemeClr val="tx1"/>
+            </a:solidFill>
+          </a:ln>
+        </p:spPr>
+        <p:style>
+          <a:lnRef idx="2">
+            <a:schemeClr val="accent1">
+              <a:shade val="15000"/>
+            </a:schemeClr>
+          </a:lnRef>
+          <a:fillRef idx="1">
+            <a:schemeClr val="accent1"/>
+          </a:fillRef>
+          <a:effectRef idx="0">
+            <a:schemeClr val="accent1"/>
+          </a:effectRef>
+          <a:fontRef idx="minor">
+            <a:schemeClr val="lt1"/>
+          </a:fontRef>
+        </p:style>
+        <p:txBody>
+          <a:bodyPr rtlCol="0" anchor="ctr"/>
+          <a:lstStyle/>
+          <a:p>
+            <a:pPr algn="ctr"/>
+            <a:r>
+              <a:rPr lang="en-GB" dirty="0"/>
+              <a:t>3</a:t>
+            </a:r>
+            <a:endParaRPr lang="da-DK" dirty="0"/>
+          </a:p>
+        </p:txBody>
+      </p:sp>
+      <p:sp>
+        <p:nvSpPr>
+          <p:cNvPr id="47" name="Rutediagram: Forbindelse 46">
+            <a:extLst>
+              <a:ext uri="{FF2B5EF4-FFF2-40B4-BE49-F238E27FC236}">
+                <a16:creationId xmlns:a16="http://schemas.microsoft.com/office/drawing/2014/main" id="{CD78828D-37A2-3689-5553-1C2449FE1D9D}"/>
+              </a:ext>
+            </a:extLst>
+          </p:cNvPr>
+          <p:cNvSpPr/>
+          <p:nvPr/>
+        </p:nvSpPr>
+        <p:spPr>
+          <a:xfrm>
+            <a:off x="4685994" y="3117612"/>
+            <a:ext cx="415636" cy="425577"/>
+          </a:xfrm>
+          <a:prstGeom prst="flowChartConnector">
+            <a:avLst/>
+          </a:prstGeom>
+          <a:solidFill>
+            <a:schemeClr val="accent3">
+              <a:lumMod val="75000"/>
+            </a:schemeClr>
+          </a:solidFill>
+          <a:ln>
+            <a:solidFill>
+              <a:schemeClr val="tx1"/>
+            </a:solidFill>
+          </a:ln>
+        </p:spPr>
+        <p:style>
+          <a:lnRef idx="2">
+            <a:schemeClr val="accent1">
+              <a:shade val="15000"/>
+            </a:schemeClr>
+          </a:lnRef>
+          <a:fillRef idx="1">
+            <a:schemeClr val="accent1"/>
+          </a:fillRef>
+          <a:effectRef idx="0">
+            <a:schemeClr val="accent1"/>
+          </a:effectRef>
+          <a:fontRef idx="minor">
+            <a:schemeClr val="lt1"/>
+          </a:fontRef>
+        </p:style>
+        <p:txBody>
+          <a:bodyPr rtlCol="0" anchor="ctr"/>
+          <a:lstStyle/>
+          <a:p>
+            <a:pPr algn="ctr"/>
+            <a:r>
+              <a:rPr lang="en-GB" dirty="0"/>
+              <a:t>4</a:t>
+            </a:r>
+            <a:endParaRPr lang="da-DK" dirty="0"/>
+          </a:p>
+        </p:txBody>
+      </p:sp>
+    </p:spTree>
+    <p:extLst>
+      <p:ext uri="{BB962C8B-B14F-4D97-AF65-F5344CB8AC3E}">
+        <p14:creationId xmlns:p14="http://schemas.microsoft.com/office/powerpoint/2010/main" val="2425626163"/>
       </p:ext>
     </p:extLst>
   </p:cSld>

</xml_diff>